<commit_message>
Add documentation for version 2 of app
- all additions in docs/documentation.md
- includes new system design diagram
- new prototype diagram
- new archive area for previous version
</commit_message>
<xml_diff>
--- a/docs/assets/prototype.pptx
+++ b/docs/assets/prototype.pptx
@@ -244,7 +244,7 @@
           <a:p>
             <a:fld id="{C0F51704-C259-474B-AB88-F9D1DF1C36AC}" type="datetimeFigureOut">
               <a:rPr lang="en-GB" smtClean="0"/>
-              <a:t>19/07/2021</a:t>
+              <a:t>29/08/2021</a:t>
             </a:fld>
             <a:endParaRPr lang="en-GB"/>
           </a:p>
@@ -414,7 +414,7 @@
           <a:p>
             <a:fld id="{C0F51704-C259-474B-AB88-F9D1DF1C36AC}" type="datetimeFigureOut">
               <a:rPr lang="en-GB" smtClean="0"/>
-              <a:t>19/07/2021</a:t>
+              <a:t>29/08/2021</a:t>
             </a:fld>
             <a:endParaRPr lang="en-GB"/>
           </a:p>
@@ -594,7 +594,7 @@
           <a:p>
             <a:fld id="{C0F51704-C259-474B-AB88-F9D1DF1C36AC}" type="datetimeFigureOut">
               <a:rPr lang="en-GB" smtClean="0"/>
-              <a:t>19/07/2021</a:t>
+              <a:t>29/08/2021</a:t>
             </a:fld>
             <a:endParaRPr lang="en-GB"/>
           </a:p>
@@ -764,7 +764,7 @@
           <a:p>
             <a:fld id="{C0F51704-C259-474B-AB88-F9D1DF1C36AC}" type="datetimeFigureOut">
               <a:rPr lang="en-GB" smtClean="0"/>
-              <a:t>19/07/2021</a:t>
+              <a:t>29/08/2021</a:t>
             </a:fld>
             <a:endParaRPr lang="en-GB"/>
           </a:p>
@@ -1008,7 +1008,7 @@
           <a:p>
             <a:fld id="{C0F51704-C259-474B-AB88-F9D1DF1C36AC}" type="datetimeFigureOut">
               <a:rPr lang="en-GB" smtClean="0"/>
-              <a:t>19/07/2021</a:t>
+              <a:t>29/08/2021</a:t>
             </a:fld>
             <a:endParaRPr lang="en-GB"/>
           </a:p>
@@ -1240,7 +1240,7 @@
           <a:p>
             <a:fld id="{C0F51704-C259-474B-AB88-F9D1DF1C36AC}" type="datetimeFigureOut">
               <a:rPr lang="en-GB" smtClean="0"/>
-              <a:t>19/07/2021</a:t>
+              <a:t>29/08/2021</a:t>
             </a:fld>
             <a:endParaRPr lang="en-GB"/>
           </a:p>
@@ -1607,7 +1607,7 @@
           <a:p>
             <a:fld id="{C0F51704-C259-474B-AB88-F9D1DF1C36AC}" type="datetimeFigureOut">
               <a:rPr lang="en-GB" smtClean="0"/>
-              <a:t>19/07/2021</a:t>
+              <a:t>29/08/2021</a:t>
             </a:fld>
             <a:endParaRPr lang="en-GB"/>
           </a:p>
@@ -1725,7 +1725,7 @@
           <a:p>
             <a:fld id="{C0F51704-C259-474B-AB88-F9D1DF1C36AC}" type="datetimeFigureOut">
               <a:rPr lang="en-GB" smtClean="0"/>
-              <a:t>19/07/2021</a:t>
+              <a:t>29/08/2021</a:t>
             </a:fld>
             <a:endParaRPr lang="en-GB"/>
           </a:p>
@@ -1820,7 +1820,7 @@
           <a:p>
             <a:fld id="{C0F51704-C259-474B-AB88-F9D1DF1C36AC}" type="datetimeFigureOut">
               <a:rPr lang="en-GB" smtClean="0"/>
-              <a:t>19/07/2021</a:t>
+              <a:t>29/08/2021</a:t>
             </a:fld>
             <a:endParaRPr lang="en-GB"/>
           </a:p>
@@ -2097,7 +2097,7 @@
           <a:p>
             <a:fld id="{C0F51704-C259-474B-AB88-F9D1DF1C36AC}" type="datetimeFigureOut">
               <a:rPr lang="en-GB" smtClean="0"/>
-              <a:t>19/07/2021</a:t>
+              <a:t>29/08/2021</a:t>
             </a:fld>
             <a:endParaRPr lang="en-GB"/>
           </a:p>
@@ -2354,7 +2354,7 @@
           <a:p>
             <a:fld id="{C0F51704-C259-474B-AB88-F9D1DF1C36AC}" type="datetimeFigureOut">
               <a:rPr lang="en-GB" smtClean="0"/>
-              <a:t>19/07/2021</a:t>
+              <a:t>29/08/2021</a:t>
             </a:fld>
             <a:endParaRPr lang="en-GB"/>
           </a:p>
@@ -2567,7 +2567,7 @@
           <a:p>
             <a:fld id="{C0F51704-C259-474B-AB88-F9D1DF1C36AC}" type="datetimeFigureOut">
               <a:rPr lang="en-GB" smtClean="0"/>
-              <a:t>19/07/2021</a:t>
+              <a:t>29/08/2021</a:t>
             </a:fld>
             <a:endParaRPr lang="en-GB"/>
           </a:p>
@@ -5170,9 +5170,8 @@
             <a:avLst/>
           </a:prstGeom>
           <a:solidFill>
-            <a:schemeClr val="tx1">
-              <a:lumMod val="85000"/>
-              <a:lumOff val="15000"/>
+            <a:schemeClr val="bg2">
+              <a:lumMod val="50000"/>
             </a:schemeClr>
           </a:solidFill>
           <a:ln>
@@ -5230,7 +5229,7 @@
           </a:prstGeom>
           <a:solidFill>
             <a:schemeClr val="bg2">
-              <a:lumMod val="25000"/>
+              <a:lumMod val="75000"/>
             </a:schemeClr>
           </a:solidFill>
           <a:ln>
@@ -5283,9 +5282,7 @@
             <a:avLst/>
           </a:prstGeom>
           <a:solidFill>
-            <a:schemeClr val="accent6">
-              <a:lumMod val="75000"/>
-            </a:schemeClr>
+            <a:srgbClr val="305252"/>
           </a:solidFill>
           <a:ln>
             <a:noFill/>
@@ -5983,9 +5980,7 @@
             <a:avLst/>
           </a:prstGeom>
           <a:solidFill>
-            <a:schemeClr val="accent6">
-              <a:lumMod val="75000"/>
-            </a:schemeClr>
+            <a:srgbClr val="305252"/>
           </a:solidFill>
           <a:ln>
             <a:solidFill>
@@ -6515,9 +6510,7 @@
             <a:avLst/>
           </a:prstGeom>
           <a:solidFill>
-            <a:schemeClr val="accent6">
-              <a:lumMod val="75000"/>
-            </a:schemeClr>
+            <a:srgbClr val="305252"/>
           </a:solidFill>
           <a:ln>
             <a:noFill/>
@@ -7099,9 +7092,7 @@
             <a:avLst/>
           </a:prstGeom>
           <a:solidFill>
-            <a:schemeClr val="accent6">
-              <a:lumMod val="75000"/>
-            </a:schemeClr>
+            <a:srgbClr val="305252"/>
           </a:solidFill>
           <a:ln>
             <a:noFill/>
@@ -7511,9 +7502,7 @@
             <a:chExt cx="735010" cy="717291"/>
           </a:xfrm>
           <a:solidFill>
-            <a:schemeClr val="accent6">
-              <a:lumMod val="50000"/>
-            </a:schemeClr>
+            <a:srgbClr val="305252"/>
           </a:solidFill>
         </p:grpSpPr>
         <p:sp>
@@ -7610,6 +7599,100 @@
           </p:style>
         </p:cxnSp>
       </p:grpSp>
+      <p:sp>
+        <p:nvSpPr>
+          <p:cNvPr id="67" name="Rectangle 66">
+            <a:extLst>
+              <a:ext uri="{FF2B5EF4-FFF2-40B4-BE49-F238E27FC236}">
+                <a16:creationId xmlns:a16="http://schemas.microsoft.com/office/drawing/2014/main" id="{5913BC80-204A-4635-9AC7-7847806494D9}"/>
+              </a:ext>
+            </a:extLst>
+          </p:cNvPr>
+          <p:cNvSpPr/>
+          <p:nvPr/>
+        </p:nvSpPr>
+        <p:spPr>
+          <a:xfrm>
+            <a:off x="5585881" y="4712732"/>
+            <a:ext cx="320675" cy="304800"/>
+          </a:xfrm>
+          <a:prstGeom prst="rect">
+            <a:avLst/>
+          </a:prstGeom>
+          <a:solidFill>
+            <a:schemeClr val="tx1">
+              <a:lumMod val="65000"/>
+              <a:lumOff val="35000"/>
+            </a:schemeClr>
+          </a:solidFill>
+          <a:ln>
+            <a:solidFill>
+              <a:schemeClr val="bg1"/>
+            </a:solidFill>
+          </a:ln>
+        </p:spPr>
+        <p:style>
+          <a:lnRef idx="2">
+            <a:schemeClr val="dk1"/>
+          </a:lnRef>
+          <a:fillRef idx="1">
+            <a:schemeClr val="lt1"/>
+          </a:fillRef>
+          <a:effectRef idx="0">
+            <a:schemeClr val="dk1"/>
+          </a:effectRef>
+          <a:fontRef idx="minor">
+            <a:schemeClr val="dk1"/>
+          </a:fontRef>
+        </p:style>
+        <p:txBody>
+          <a:bodyPr rtlCol="0" anchor="ctr"/>
+          <a:lstStyle/>
+          <a:p>
+            <a:pPr algn="ctr"/>
+            <a:endParaRPr lang="en-GB" dirty="0"/>
+          </a:p>
+        </p:txBody>
+      </p:sp>
+      <p:sp>
+        <p:nvSpPr>
+          <p:cNvPr id="68" name="TextBox 67">
+            <a:extLst>
+              <a:ext uri="{FF2B5EF4-FFF2-40B4-BE49-F238E27FC236}">
+                <a16:creationId xmlns:a16="http://schemas.microsoft.com/office/drawing/2014/main" id="{83EE1ACB-DB0A-426F-874A-184E82039745}"/>
+              </a:ext>
+            </a:extLst>
+          </p:cNvPr>
+          <p:cNvSpPr txBox="1"/>
+          <p:nvPr/>
+        </p:nvSpPr>
+        <p:spPr>
+          <a:xfrm>
+            <a:off x="5511196" y="4213682"/>
+            <a:ext cx="1022882" cy="461665"/>
+          </a:xfrm>
+          <a:prstGeom prst="rect">
+            <a:avLst/>
+          </a:prstGeom>
+          <a:noFill/>
+        </p:spPr>
+        <p:txBody>
+          <a:bodyPr wrap="square" rtlCol="0">
+            <a:spAutoFit/>
+          </a:bodyPr>
+          <a:lstStyle/>
+          <a:p>
+            <a:r>
+              <a:rPr lang="en-GB" sz="1200" dirty="0">
+                <a:solidFill>
+                  <a:schemeClr val="bg1"/>
+                </a:solidFill>
+              </a:rPr>
+              <a:t>Fresh Search (slower)</a:t>
+            </a:r>
+          </a:p>
+        </p:txBody>
+      </p:sp>
     </p:spTree>
     <p:extLst>
       <p:ext uri="{BB962C8B-B14F-4D97-AF65-F5344CB8AC3E}">

</xml_diff>